<commit_message>
added common scenarios ppt
</commit_message>
<xml_diff>
--- a/Whiteboad design session/Whiteboard design session trainer presentation - Continuous delivery with VSTS and Azure.pptx
+++ b/Whiteboad design session/Whiteboard design session trainer presentation - Continuous delivery with VSTS and Azure.pptx
@@ -6,7 +6,7 @@
     <p:sldMasterId id="2147483665" r:id="rId2"/>
   </p:sldMasterIdLst>
   <p:notesMasterIdLst>
-    <p:notesMasterId r:id="rId27"/>
+    <p:notesMasterId r:id="rId29"/>
   </p:notesMasterIdLst>
   <p:sldIdLst>
     <p:sldId id="300" r:id="rId3"/>
@@ -21,18 +21,20 @@
     <p:sldId id="325" r:id="rId12"/>
     <p:sldId id="326" r:id="rId13"/>
     <p:sldId id="340" r:id="rId14"/>
-    <p:sldId id="320" r:id="rId15"/>
-    <p:sldId id="349" r:id="rId16"/>
-    <p:sldId id="350" r:id="rId17"/>
-    <p:sldId id="321" r:id="rId18"/>
-    <p:sldId id="341" r:id="rId19"/>
-    <p:sldId id="342" r:id="rId20"/>
-    <p:sldId id="345" r:id="rId21"/>
-    <p:sldId id="346" r:id="rId22"/>
-    <p:sldId id="348" r:id="rId23"/>
-    <p:sldId id="347" r:id="rId24"/>
-    <p:sldId id="318" r:id="rId25"/>
-    <p:sldId id="315" r:id="rId26"/>
+    <p:sldId id="352" r:id="rId15"/>
+    <p:sldId id="320" r:id="rId16"/>
+    <p:sldId id="349" r:id="rId17"/>
+    <p:sldId id="350" r:id="rId18"/>
+    <p:sldId id="321" r:id="rId19"/>
+    <p:sldId id="351" r:id="rId20"/>
+    <p:sldId id="341" r:id="rId21"/>
+    <p:sldId id="342" r:id="rId22"/>
+    <p:sldId id="345" r:id="rId23"/>
+    <p:sldId id="346" r:id="rId24"/>
+    <p:sldId id="348" r:id="rId25"/>
+    <p:sldId id="347" r:id="rId26"/>
+    <p:sldId id="318" r:id="rId27"/>
+    <p:sldId id="315" r:id="rId28"/>
   </p:sldIdLst>
   <p:sldSz cx="12192000" cy="6858000"/>
   <p:notesSz cx="6858000" cy="9144000"/>
@@ -224,7 +226,7 @@
           <a:p>
             <a:fld id="{52A13B17-C506-4D51-BB37-16B365906619}" type="datetimeFigureOut">
               <a:rPr lang="en-US" smtClean="0"/>
-              <a:t>4/22/2018</a:t>
+              <a:t>6/14/2018</a:t>
             </a:fld>
             <a:endParaRPr lang="en-US"/>
           </a:p>
@@ -983,7 +985,7 @@
           <a:p>
             <a:fld id="{0998D5BB-B127-481F-BC0A-2F77C576BB34}" type="slidenum">
               <a:rPr lang="en-US" smtClean="0"/>
-              <a:t>13</a:t>
+              <a:t>14</a:t>
             </a:fld>
             <a:endParaRPr lang="en-US"/>
           </a:p>
@@ -1067,7 +1069,7 @@
           <a:p>
             <a:fld id="{0998D5BB-B127-481F-BC0A-2F77C576BB34}" type="slidenum">
               <a:rPr lang="en-US" smtClean="0"/>
-              <a:t>14</a:t>
+              <a:t>15</a:t>
             </a:fld>
             <a:endParaRPr lang="en-US" dirty="0"/>
           </a:p>
@@ -1151,7 +1153,7 @@
           <a:p>
             <a:fld id="{0998D5BB-B127-481F-BC0A-2F77C576BB34}" type="slidenum">
               <a:rPr lang="en-US" smtClean="0"/>
-              <a:t>15</a:t>
+              <a:t>16</a:t>
             </a:fld>
             <a:endParaRPr lang="en-US" dirty="0"/>
           </a:p>
@@ -1235,7 +1237,7 @@
           <a:p>
             <a:fld id="{0998D5BB-B127-481F-BC0A-2F77C576BB34}" type="slidenum">
               <a:rPr lang="en-US" smtClean="0"/>
-              <a:t>16</a:t>
+              <a:t>17</a:t>
             </a:fld>
             <a:endParaRPr lang="en-US"/>
           </a:p>
@@ -1319,7 +1321,7 @@
           <a:p>
             <a:fld id="{0998D5BB-B127-481F-BC0A-2F77C576BB34}" type="slidenum">
               <a:rPr lang="en-US" smtClean="0"/>
-              <a:t>17</a:t>
+              <a:t>19</a:t>
             </a:fld>
             <a:endParaRPr lang="en-US"/>
           </a:p>
@@ -1403,7 +1405,7 @@
           <a:p>
             <a:fld id="{0998D5BB-B127-481F-BC0A-2F77C576BB34}" type="slidenum">
               <a:rPr lang="en-US" smtClean="0"/>
-              <a:t>18</a:t>
+              <a:t>20</a:t>
             </a:fld>
             <a:endParaRPr lang="en-US"/>
           </a:p>
@@ -1487,7 +1489,7 @@
           <a:p>
             <a:fld id="{0998D5BB-B127-481F-BC0A-2F77C576BB34}" type="slidenum">
               <a:rPr lang="en-US" smtClean="0"/>
-              <a:t>19</a:t>
+              <a:t>21</a:t>
             </a:fld>
             <a:endParaRPr lang="en-US"/>
           </a:p>
@@ -1655,7 +1657,7 @@
           <a:p>
             <a:fld id="{0998D5BB-B127-481F-BC0A-2F77C576BB34}" type="slidenum">
               <a:rPr lang="en-US" smtClean="0"/>
-              <a:t>20</a:t>
+              <a:t>22</a:t>
             </a:fld>
             <a:endParaRPr lang="en-US"/>
           </a:p>
@@ -1739,7 +1741,7 @@
           <a:p>
             <a:fld id="{0998D5BB-B127-481F-BC0A-2F77C576BB34}" type="slidenum">
               <a:rPr lang="en-US" smtClean="0"/>
-              <a:t>21</a:t>
+              <a:t>23</a:t>
             </a:fld>
             <a:endParaRPr lang="en-US"/>
           </a:p>
@@ -1823,7 +1825,7 @@
           <a:p>
             <a:fld id="{0998D5BB-B127-481F-BC0A-2F77C576BB34}" type="slidenum">
               <a:rPr lang="en-US" smtClean="0"/>
-              <a:t>22</a:t>
+              <a:t>24</a:t>
             </a:fld>
             <a:endParaRPr lang="en-US"/>
           </a:p>
@@ -1907,7 +1909,7 @@
           <a:p>
             <a:fld id="{0998D5BB-B127-481F-BC0A-2F77C576BB34}" type="slidenum">
               <a:rPr lang="en-US" smtClean="0"/>
-              <a:t>23</a:t>
+              <a:t>25</a:t>
             </a:fld>
             <a:endParaRPr lang="en-US"/>
           </a:p>
@@ -2033,7 +2035,7 @@
                   <a:prstClr val="black"/>
                 </a:solidFill>
               </a:rPr>
-              <a:t>4/22/2018 8:00 PM</a:t>
+              <a:t>6/14/2018 4:39 AM</a:t>
             </a:fld>
             <a:endParaRPr lang="en-US" dirty="0">
               <a:solidFill>
@@ -2065,7 +2067,7 @@
                 </a:solidFill>
               </a:rPr>
               <a:pPr/>
-              <a:t>24</a:t>
+              <a:t>26</a:t>
             </a:fld>
             <a:endParaRPr lang="en-US" dirty="0">
               <a:solidFill>
@@ -16337,11 +16339,16 @@
                 <a:solidFill>
                   <a:schemeClr val="tx1"/>
                 </a:solidFill>
-                <a:latin typeface="Segoe UI Light" panose="020B0502040204020203" pitchFamily="34" charset="0"/>
-                <a:cs typeface="Segoe UI Light" panose="020B0502040204020203" pitchFamily="34" charset="0"/>
               </a:rPr>
-              <a:t>Potential issues, objections and blockers</a:t>
+              <a:t>Customer objections</a:t>
             </a:r>
+            <a:endParaRPr lang="en-US" sz="4400" dirty="0">
+              <a:solidFill>
+                <a:schemeClr val="tx1"/>
+              </a:solidFill>
+              <a:latin typeface="Segoe UI Light" panose="020B0502040204020203" pitchFamily="34" charset="0"/>
+              <a:cs typeface="Segoe UI Light" panose="020B0502040204020203" pitchFamily="34" charset="0"/>
+            </a:endParaRPr>
           </a:p>
         </p:txBody>
       </p:sp>
@@ -16373,10 +16380,6 @@
           </a:bodyPr>
           <a:lstStyle/>
           <a:p>
-            <a:pPr marL="514350" indent="-514350">
-              <a:buFont typeface="+mj-lt"/>
-              <a:buAutoNum type="arabicPeriod"/>
-            </a:pPr>
             <a:r>
               <a:rPr lang="en-US" sz="2800" dirty="0"/>
               <a:t>“We do not want to be locked into a specific source control repository. We are evaluating GitHub and Visual Studio Team Services and need to be able to change between them without frustrating rework.”</a:t>
@@ -16390,10 +16393,6 @@
             <a:endParaRPr lang="en-US" sz="2800" dirty="0"/>
           </a:p>
           <a:p>
-            <a:pPr marL="514350" indent="-514350">
-              <a:buFont typeface="+mj-lt"/>
-              <a:buAutoNum type="arabicPeriod"/>
-            </a:pPr>
             <a:r>
               <a:rPr lang="en-US" sz="2800" dirty="0"/>
               <a:t>“We do not want the developers to be able to make changes to the Azure resources even though they will have access to make source code changes.”</a:t>
@@ -16407,10 +16406,6 @@
             <a:endParaRPr lang="en-US" sz="2800" dirty="0"/>
           </a:p>
           <a:p>
-            <a:pPr marL="514350" indent="-514350">
-              <a:buFont typeface="+mj-lt"/>
-              <a:buAutoNum type="arabicPeriod"/>
-            </a:pPr>
             <a:r>
               <a:rPr lang="en-US" sz="2800" dirty="0"/>
               <a:t>“If developers can deploy directly to the cloud, will that expose us to the same quality problems we had before when untested code was promoted to production?”</a:t>
@@ -16478,11 +16473,16 @@
                 <a:solidFill>
                   <a:schemeClr val="tx1"/>
                 </a:solidFill>
-                <a:latin typeface="Segoe UI Light" panose="020B0502040204020203" pitchFamily="34" charset="0"/>
-                <a:cs typeface="Segoe UI Light" panose="020B0502040204020203" pitchFamily="34" charset="0"/>
               </a:rPr>
-              <a:t>Potential issues, objections and blockers</a:t>
+              <a:t>Customer objections</a:t>
             </a:r>
+            <a:endParaRPr lang="en-US" sz="4400" dirty="0">
+              <a:solidFill>
+                <a:schemeClr val="tx1"/>
+              </a:solidFill>
+              <a:latin typeface="Segoe UI Light" panose="020B0502040204020203" pitchFamily="34" charset="0"/>
+              <a:cs typeface="Segoe UI Light" panose="020B0502040204020203" pitchFamily="34" charset="0"/>
+            </a:endParaRPr>
           </a:p>
         </p:txBody>
       </p:sp>
@@ -16514,10 +16514,6 @@
           </a:bodyPr>
           <a:lstStyle/>
           <a:p>
-            <a:pPr marL="514350" indent="-514350">
-              <a:buFont typeface="+mj-lt"/>
-              <a:buAutoNum type="arabicPeriod" startAt="4"/>
-            </a:pPr>
             <a:r>
               <a:rPr lang="en-US" sz="2800" dirty="0"/>
               <a:t>“How much of an impact will these process changes have on our development cadence? Will learning this place a new burden on the developers?”</a:t>
@@ -16531,10 +16527,6 @@
             <a:endParaRPr lang="en-US" sz="2800" dirty="0"/>
           </a:p>
           <a:p>
-            <a:pPr marL="514350" indent="-514350">
-              <a:buFont typeface="+mj-lt"/>
-              <a:buAutoNum type="arabicPeriod" startAt="4"/>
-            </a:pPr>
             <a:r>
               <a:rPr lang="en-US" sz="2800" dirty="0"/>
               <a:t>“Our developers are already having challenges learning how to use Git – will adding a continuous deployment system on top of that slow them down and confuse them even more?”</a:t>
@@ -16582,6 +16574,97 @@
       </p:grpSpPr>
       <p:sp>
         <p:nvSpPr>
+          <p:cNvPr id="3" name="Title 2">
+            <a:extLst>
+              <a:ext uri="{FF2B5EF4-FFF2-40B4-BE49-F238E27FC236}">
+                <a16:creationId xmlns:a16="http://schemas.microsoft.com/office/drawing/2014/main" id="{EE850E3B-AE59-4605-8BC1-1A57A3CBBF2E}"/>
+              </a:ext>
+            </a:extLst>
+          </p:cNvPr>
+          <p:cNvSpPr>
+            <a:spLocks noGrp="1"/>
+          </p:cNvSpPr>
+          <p:nvPr>
+            <p:ph type="title"/>
+          </p:nvPr>
+        </p:nvSpPr>
+        <p:spPr/>
+        <p:txBody>
+          <a:bodyPr/>
+          <a:lstStyle/>
+          <a:p>
+            <a:r>
+              <a:rPr lang="en-US" dirty="0"/>
+              <a:t>Common Scenarios</a:t>
+            </a:r>
+          </a:p>
+        </p:txBody>
+      </p:sp>
+      <p:pic>
+        <p:nvPicPr>
+          <p:cNvPr id="4" name="Picture 3">
+            <a:extLst>
+              <a:ext uri="{FF2B5EF4-FFF2-40B4-BE49-F238E27FC236}">
+                <a16:creationId xmlns:a16="http://schemas.microsoft.com/office/drawing/2014/main" id="{C2641F24-8D8E-42A7-A624-C928CC5AC136}"/>
+              </a:ext>
+            </a:extLst>
+          </p:cNvPr>
+          <p:cNvPicPr>
+            <a:picLocks noChangeAspect="1"/>
+          </p:cNvPicPr>
+          <p:nvPr/>
+        </p:nvPicPr>
+        <p:blipFill>
+          <a:blip r:embed="rId2"/>
+          <a:stretch>
+            <a:fillRect/>
+          </a:stretch>
+        </p:blipFill>
+        <p:spPr>
+          <a:xfrm>
+            <a:off x="904837" y="1795450"/>
+            <a:ext cx="10382326" cy="3267099"/>
+          </a:xfrm>
+          <a:prstGeom prst="rect">
+            <a:avLst/>
+          </a:prstGeom>
+        </p:spPr>
+      </p:pic>
+    </p:spTree>
+    <p:extLst>
+      <p:ext uri="{BB962C8B-B14F-4D97-AF65-F5344CB8AC3E}">
+        <p14:creationId xmlns:p14="http://schemas.microsoft.com/office/powerpoint/2010/main" val="3958827824"/>
+      </p:ext>
+    </p:extLst>
+  </p:cSld>
+  <p:clrMapOvr>
+    <a:masterClrMapping/>
+  </p:clrMapOvr>
+  <p:transition>
+    <p:fade/>
+  </p:transition>
+</p:sld>
+</file>
+
+<file path=ppt/slides/slide14.xml><?xml version="1.0" encoding="utf-8"?>
+<p:sld xmlns:a="http://schemas.openxmlformats.org/drawingml/2006/main" xmlns:r="http://schemas.openxmlformats.org/officeDocument/2006/relationships" xmlns:p="http://schemas.openxmlformats.org/presentationml/2006/main">
+  <p:cSld>
+    <p:spTree>
+      <p:nvGrpSpPr>
+        <p:cNvPr id="1" name=""/>
+        <p:cNvGrpSpPr/>
+        <p:nvPr/>
+      </p:nvGrpSpPr>
+      <p:grpSpPr>
+        <a:xfrm>
+          <a:off x="0" y="0"/>
+          <a:ext cx="0" cy="0"/>
+          <a:chOff x="0" y="0"/>
+          <a:chExt cx="0" cy="0"/>
+        </a:xfrm>
+      </p:grpSpPr>
+      <p:sp>
+        <p:nvSpPr>
           <p:cNvPr id="2" name="Title 1"/>
           <p:cNvSpPr>
             <a:spLocks noGrp="1"/>
@@ -16742,7 +16825,7 @@
 </p:sld>
 </file>
 
-<file path=ppt/slides/slide14.xml><?xml version="1.0" encoding="utf-8"?>
+<file path=ppt/slides/slide15.xml><?xml version="1.0" encoding="utf-8"?>
 <p:sld xmlns:a="http://schemas.openxmlformats.org/drawingml/2006/main" xmlns:r="http://schemas.openxmlformats.org/officeDocument/2006/relationships" xmlns:p="http://schemas.openxmlformats.org/presentationml/2006/main">
   <p:cSld>
     <p:spTree>
@@ -17288,310 +17371,6 @@
 </p:sld>
 </file>
 
-<file path=ppt/slides/slide15.xml><?xml version="1.0" encoding="utf-8"?>
-<p:sld xmlns:a="http://schemas.openxmlformats.org/drawingml/2006/main" xmlns:r="http://schemas.openxmlformats.org/officeDocument/2006/relationships" xmlns:p="http://schemas.openxmlformats.org/presentationml/2006/main">
-  <p:cSld>
-    <p:spTree>
-      <p:nvGrpSpPr>
-        <p:cNvPr id="1" name=""/>
-        <p:cNvGrpSpPr/>
-        <p:nvPr/>
-      </p:nvGrpSpPr>
-      <p:grpSpPr>
-        <a:xfrm>
-          <a:off x="0" y="0"/>
-          <a:ext cx="0" cy="0"/>
-          <a:chOff x="0" y="0"/>
-          <a:chExt cx="0" cy="0"/>
-        </a:xfrm>
-      </p:grpSpPr>
-      <p:sp>
-        <p:nvSpPr>
-          <p:cNvPr id="2" name="Title 1"/>
-          <p:cNvSpPr>
-            <a:spLocks noGrp="1"/>
-          </p:cNvSpPr>
-          <p:nvPr>
-            <p:ph type="title"/>
-          </p:nvPr>
-        </p:nvSpPr>
-        <p:spPr/>
-        <p:txBody>
-          <a:bodyPr>
-            <a:normAutofit/>
-          </a:bodyPr>
-          <a:lstStyle/>
-          <a:p>
-            <a:r>
-              <a:rPr lang="en-US" sz="4400" dirty="0">
-                <a:solidFill>
-                  <a:schemeClr val="tx1"/>
-                </a:solidFill>
-                <a:latin typeface="Segoe UI Light" panose="020B0502040204020203" pitchFamily="34" charset="0"/>
-                <a:cs typeface="Segoe UI Light" panose="020B0502040204020203" pitchFamily="34" charset="0"/>
-              </a:rPr>
-              <a:t>Step 3: Present the solution</a:t>
-            </a:r>
-          </a:p>
-        </p:txBody>
-      </p:sp>
-      <p:sp>
-        <p:nvSpPr>
-          <p:cNvPr id="9" name="TextBox 8">
-            <a:extLst>
-              <a:ext uri="{FF2B5EF4-FFF2-40B4-BE49-F238E27FC236}">
-                <a16:creationId xmlns:a16="http://schemas.microsoft.com/office/drawing/2014/main" id="{0F86F9F9-39B5-4CE6-AF48-9ADAE40EA728}"/>
-              </a:ext>
-            </a:extLst>
-          </p:cNvPr>
-          <p:cNvSpPr txBox="1"/>
-          <p:nvPr/>
-        </p:nvSpPr>
-        <p:spPr>
-          <a:xfrm>
-            <a:off x="340285" y="1062166"/>
-            <a:ext cx="10229103" cy="5838521"/>
-          </a:xfrm>
-          <a:prstGeom prst="rect">
-            <a:avLst/>
-          </a:prstGeom>
-          <a:noFill/>
-        </p:spPr>
-        <p:txBody>
-          <a:bodyPr wrap="square" lIns="182880" tIns="146304" rIns="182880" bIns="146304" rtlCol="0">
-            <a:spAutoFit/>
-          </a:bodyPr>
-          <a:lstStyle/>
-          <a:p>
-            <a:pPr>
-              <a:lnSpc>
-                <a:spcPct val="90000"/>
-              </a:lnSpc>
-              <a:spcAft>
-                <a:spcPts val="600"/>
-              </a:spcAft>
-            </a:pPr>
-            <a:r>
-              <a:rPr lang="en-US" sz="3600" dirty="0">
-                <a:latin typeface="+mj-lt"/>
-              </a:rPr>
-              <a:t>Outcome</a:t>
-            </a:r>
-          </a:p>
-          <a:p>
-            <a:pPr>
-              <a:lnSpc>
-                <a:spcPct val="90000"/>
-              </a:lnSpc>
-              <a:spcAft>
-                <a:spcPts val="600"/>
-              </a:spcAft>
-            </a:pPr>
-            <a:r>
-              <a:rPr lang="en-US" sz="2400" dirty="0">
-                <a:latin typeface="Segoe UI Semilight" panose="020B0402040204020203" pitchFamily="34" charset="0"/>
-                <a:cs typeface="Segoe UI Semilight" panose="020B0402040204020203" pitchFamily="34" charset="0"/>
-              </a:rPr>
-              <a:t>Present a solution to the target customer in a 15-minute chalk-talk format </a:t>
-            </a:r>
-            <a:endParaRPr lang="en-US" sz="3600" dirty="0">
-              <a:latin typeface="+mj-lt"/>
-            </a:endParaRPr>
-          </a:p>
-          <a:p>
-            <a:pPr>
-              <a:lnSpc>
-                <a:spcPct val="90000"/>
-              </a:lnSpc>
-              <a:spcAft>
-                <a:spcPts val="600"/>
-              </a:spcAft>
-            </a:pPr>
-            <a:endParaRPr lang="en-US" sz="2400" dirty="0">
-              <a:latin typeface="+mj-lt"/>
-            </a:endParaRPr>
-          </a:p>
-          <a:p>
-            <a:pPr>
-              <a:lnSpc>
-                <a:spcPct val="90000"/>
-              </a:lnSpc>
-              <a:spcAft>
-                <a:spcPts val="600"/>
-              </a:spcAft>
-            </a:pPr>
-            <a:r>
-              <a:rPr lang="en-US" sz="3600" dirty="0">
-                <a:latin typeface="+mj-lt"/>
-              </a:rPr>
-              <a:t>Timeframe</a:t>
-            </a:r>
-          </a:p>
-          <a:p>
-            <a:pPr>
-              <a:lnSpc>
-                <a:spcPct val="90000"/>
-              </a:lnSpc>
-              <a:spcAft>
-                <a:spcPts val="600"/>
-              </a:spcAft>
-            </a:pPr>
-            <a:r>
-              <a:rPr lang="en-US" sz="2400" dirty="0">
-                <a:latin typeface="Segoe UI Semilight" panose="020B0402040204020203" pitchFamily="34" charset="0"/>
-                <a:cs typeface="Segoe UI Semilight" panose="020B0402040204020203" pitchFamily="34" charset="0"/>
-              </a:rPr>
-              <a:t>30 minutes (15 minutes for each team to present and receive feedback) </a:t>
-            </a:r>
-          </a:p>
-          <a:p>
-            <a:pPr>
-              <a:lnSpc>
-                <a:spcPct val="90000"/>
-              </a:lnSpc>
-              <a:spcAft>
-                <a:spcPts val="600"/>
-              </a:spcAft>
-            </a:pPr>
-            <a:endParaRPr lang="en-US" sz="2400" dirty="0">
-              <a:latin typeface="+mj-lt"/>
-            </a:endParaRPr>
-          </a:p>
-          <a:p>
-            <a:pPr>
-              <a:lnSpc>
-                <a:spcPct val="90000"/>
-              </a:lnSpc>
-              <a:spcAft>
-                <a:spcPts val="600"/>
-              </a:spcAft>
-            </a:pPr>
-            <a:r>
-              <a:rPr lang="en-US" sz="3600" dirty="0">
-                <a:latin typeface="+mj-lt"/>
-              </a:rPr>
-              <a:t>Directions</a:t>
-            </a:r>
-          </a:p>
-          <a:p>
-            <a:pPr marL="342900" lvl="0" indent="-342900">
-              <a:buFont typeface="Arial" panose="020B0604020202020204" pitchFamily="34" charset="0"/>
-              <a:buChar char="•"/>
-            </a:pPr>
-            <a:r>
-              <a:rPr lang="en-US" sz="2000" dirty="0">
-                <a:latin typeface="Segoe UI Semilight" panose="020B0402040204020203" pitchFamily="34" charset="0"/>
-                <a:cs typeface="Segoe UI Semilight" panose="020B0402040204020203" pitchFamily="34" charset="0"/>
-              </a:rPr>
-              <a:t>Pair with another table</a:t>
-            </a:r>
-          </a:p>
-          <a:p>
-            <a:pPr marL="342900" lvl="0" indent="-342900">
-              <a:buFont typeface="Arial" panose="020B0604020202020204" pitchFamily="34" charset="0"/>
-              <a:buChar char="•"/>
-            </a:pPr>
-            <a:r>
-              <a:rPr lang="en-US" sz="2000" dirty="0">
-                <a:latin typeface="Segoe UI Semilight" panose="020B0402040204020203" pitchFamily="34" charset="0"/>
-                <a:cs typeface="Segoe UI Semilight" panose="020B0402040204020203" pitchFamily="34" charset="0"/>
-              </a:rPr>
-              <a:t>One table is the Microsoft team and the other table is the customer</a:t>
-            </a:r>
-          </a:p>
-          <a:p>
-            <a:pPr marL="342900" lvl="0" indent="-342900">
-              <a:buFont typeface="Arial" panose="020B0604020202020204" pitchFamily="34" charset="0"/>
-              <a:buChar char="•"/>
-            </a:pPr>
-            <a:r>
-              <a:rPr lang="en-US" sz="2000" dirty="0">
-                <a:latin typeface="Segoe UI Semilight" panose="020B0402040204020203" pitchFamily="34" charset="0"/>
-                <a:cs typeface="Segoe UI Semilight" panose="020B0402040204020203" pitchFamily="34" charset="0"/>
-              </a:rPr>
-              <a:t>The Microsoft team presents their proposed solution to the customer</a:t>
-            </a:r>
-          </a:p>
-          <a:p>
-            <a:pPr marL="342900" lvl="0" indent="-342900">
-              <a:buFont typeface="Arial" panose="020B0604020202020204" pitchFamily="34" charset="0"/>
-              <a:buChar char="•"/>
-            </a:pPr>
-            <a:r>
-              <a:rPr lang="en-US" sz="2000" dirty="0">
-                <a:latin typeface="Segoe UI Semilight" panose="020B0402040204020203" pitchFamily="34" charset="0"/>
-                <a:cs typeface="Segoe UI Semilight" panose="020B0402040204020203" pitchFamily="34" charset="0"/>
-              </a:rPr>
-              <a:t>The customer asks one of the objections from the list of objections in the case study</a:t>
-            </a:r>
-          </a:p>
-          <a:p>
-            <a:pPr marL="342900" lvl="0" indent="-342900">
-              <a:buFont typeface="Arial" panose="020B0604020202020204" pitchFamily="34" charset="0"/>
-              <a:buChar char="•"/>
-            </a:pPr>
-            <a:r>
-              <a:rPr lang="en-US" sz="2000" dirty="0">
-                <a:latin typeface="Segoe UI Semilight" panose="020B0402040204020203" pitchFamily="34" charset="0"/>
-                <a:cs typeface="Segoe UI Semilight" panose="020B0402040204020203" pitchFamily="34" charset="0"/>
-              </a:rPr>
-              <a:t>The Microsoft team responds to the objection</a:t>
-            </a:r>
-          </a:p>
-          <a:p>
-            <a:pPr marL="342900" lvl="0" indent="-342900">
-              <a:buFont typeface="Arial" panose="020B0604020202020204" pitchFamily="34" charset="0"/>
-              <a:buChar char="•"/>
-            </a:pPr>
-            <a:r>
-              <a:rPr lang="en-US" sz="2000" dirty="0">
-                <a:latin typeface="Segoe UI Semilight" panose="020B0402040204020203" pitchFamily="34" charset="0"/>
-                <a:cs typeface="Segoe UI Semilight" panose="020B0402040204020203" pitchFamily="34" charset="0"/>
-              </a:rPr>
-              <a:t>The customer team gives feedback to the Microsoft team</a:t>
-            </a:r>
-            <a:endParaRPr lang="en-US" sz="2000" strike="sngStrike" dirty="0">
-              <a:latin typeface="Segoe UI Semilight" panose="020B0402040204020203" pitchFamily="34" charset="0"/>
-              <a:cs typeface="Segoe UI Semilight" panose="020B0402040204020203" pitchFamily="34" charset="0"/>
-            </a:endParaRPr>
-          </a:p>
-          <a:p>
-            <a:pPr>
-              <a:lnSpc>
-                <a:spcPct val="90000"/>
-              </a:lnSpc>
-              <a:spcAft>
-                <a:spcPts val="600"/>
-              </a:spcAft>
-            </a:pPr>
-            <a:endParaRPr lang="en-US" sz="2400" dirty="0">
-              <a:latin typeface="Segoe UI Semilight" panose="020B0402040204020203" pitchFamily="34" charset="0"/>
-              <a:cs typeface="Segoe UI Semilight" panose="020B0402040204020203" pitchFamily="34" charset="0"/>
-            </a:endParaRPr>
-          </a:p>
-        </p:txBody>
-      </p:sp>
-    </p:spTree>
-    <p:extLst>
-      <p:ext uri="{BB962C8B-B14F-4D97-AF65-F5344CB8AC3E}">
-        <p14:creationId xmlns:p14="http://schemas.microsoft.com/office/powerpoint/2010/main" val="1629842568"/>
-      </p:ext>
-    </p:extLst>
-  </p:cSld>
-  <p:clrMapOvr>
-    <a:masterClrMapping/>
-  </p:clrMapOvr>
-  <mc:AlternateContent xmlns:mc="http://schemas.openxmlformats.org/markup-compatibility/2006" xmlns:p14="http://schemas.microsoft.com/office/powerpoint/2010/main">
-    <mc:Choice Requires="p14">
-      <p:transition p14:dur="0"/>
-    </mc:Choice>
-    <mc:Fallback xmlns="">
-      <p:transition/>
-    </mc:Fallback>
-  </mc:AlternateContent>
-</p:sld>
-</file>
-
 <file path=ppt/slides/slide16.xml><?xml version="1.0" encoding="utf-8"?>
 <p:sld xmlns:a="http://schemas.openxmlformats.org/drawingml/2006/main" xmlns:r="http://schemas.openxmlformats.org/officeDocument/2006/relationships" xmlns:p="http://schemas.openxmlformats.org/presentationml/2006/main">
   <p:cSld>
@@ -17634,6 +17413,310 @@
                 <a:latin typeface="Segoe UI Light" panose="020B0502040204020203" pitchFamily="34" charset="0"/>
                 <a:cs typeface="Segoe UI Light" panose="020B0502040204020203" pitchFamily="34" charset="0"/>
               </a:rPr>
+              <a:t>Step 3: Present the solution</a:t>
+            </a:r>
+          </a:p>
+        </p:txBody>
+      </p:sp>
+      <p:sp>
+        <p:nvSpPr>
+          <p:cNvPr id="9" name="TextBox 8">
+            <a:extLst>
+              <a:ext uri="{FF2B5EF4-FFF2-40B4-BE49-F238E27FC236}">
+                <a16:creationId xmlns:a16="http://schemas.microsoft.com/office/drawing/2014/main" id="{0F86F9F9-39B5-4CE6-AF48-9ADAE40EA728}"/>
+              </a:ext>
+            </a:extLst>
+          </p:cNvPr>
+          <p:cNvSpPr txBox="1"/>
+          <p:nvPr/>
+        </p:nvSpPr>
+        <p:spPr>
+          <a:xfrm>
+            <a:off x="340285" y="1062166"/>
+            <a:ext cx="10229103" cy="5838521"/>
+          </a:xfrm>
+          <a:prstGeom prst="rect">
+            <a:avLst/>
+          </a:prstGeom>
+          <a:noFill/>
+        </p:spPr>
+        <p:txBody>
+          <a:bodyPr wrap="square" lIns="182880" tIns="146304" rIns="182880" bIns="146304" rtlCol="0">
+            <a:spAutoFit/>
+          </a:bodyPr>
+          <a:lstStyle/>
+          <a:p>
+            <a:pPr>
+              <a:lnSpc>
+                <a:spcPct val="90000"/>
+              </a:lnSpc>
+              <a:spcAft>
+                <a:spcPts val="600"/>
+              </a:spcAft>
+            </a:pPr>
+            <a:r>
+              <a:rPr lang="en-US" sz="3600" dirty="0">
+                <a:latin typeface="+mj-lt"/>
+              </a:rPr>
+              <a:t>Outcome</a:t>
+            </a:r>
+          </a:p>
+          <a:p>
+            <a:pPr>
+              <a:lnSpc>
+                <a:spcPct val="90000"/>
+              </a:lnSpc>
+              <a:spcAft>
+                <a:spcPts val="600"/>
+              </a:spcAft>
+            </a:pPr>
+            <a:r>
+              <a:rPr lang="en-US" sz="2400" dirty="0">
+                <a:latin typeface="Segoe UI Semilight" panose="020B0402040204020203" pitchFamily="34" charset="0"/>
+                <a:cs typeface="Segoe UI Semilight" panose="020B0402040204020203" pitchFamily="34" charset="0"/>
+              </a:rPr>
+              <a:t>Present a solution to the target customer in a 15-minute chalk-talk format </a:t>
+            </a:r>
+            <a:endParaRPr lang="en-US" sz="3600" dirty="0">
+              <a:latin typeface="+mj-lt"/>
+            </a:endParaRPr>
+          </a:p>
+          <a:p>
+            <a:pPr>
+              <a:lnSpc>
+                <a:spcPct val="90000"/>
+              </a:lnSpc>
+              <a:spcAft>
+                <a:spcPts val="600"/>
+              </a:spcAft>
+            </a:pPr>
+            <a:endParaRPr lang="en-US" sz="2400" dirty="0">
+              <a:latin typeface="+mj-lt"/>
+            </a:endParaRPr>
+          </a:p>
+          <a:p>
+            <a:pPr>
+              <a:lnSpc>
+                <a:spcPct val="90000"/>
+              </a:lnSpc>
+              <a:spcAft>
+                <a:spcPts val="600"/>
+              </a:spcAft>
+            </a:pPr>
+            <a:r>
+              <a:rPr lang="en-US" sz="3600" dirty="0">
+                <a:latin typeface="+mj-lt"/>
+              </a:rPr>
+              <a:t>Timeframe</a:t>
+            </a:r>
+          </a:p>
+          <a:p>
+            <a:pPr>
+              <a:lnSpc>
+                <a:spcPct val="90000"/>
+              </a:lnSpc>
+              <a:spcAft>
+                <a:spcPts val="600"/>
+              </a:spcAft>
+            </a:pPr>
+            <a:r>
+              <a:rPr lang="en-US" sz="2400" dirty="0">
+                <a:latin typeface="Segoe UI Semilight" panose="020B0402040204020203" pitchFamily="34" charset="0"/>
+                <a:cs typeface="Segoe UI Semilight" panose="020B0402040204020203" pitchFamily="34" charset="0"/>
+              </a:rPr>
+              <a:t>30 minutes (15 minutes for each team to present and receive feedback) </a:t>
+            </a:r>
+          </a:p>
+          <a:p>
+            <a:pPr>
+              <a:lnSpc>
+                <a:spcPct val="90000"/>
+              </a:lnSpc>
+              <a:spcAft>
+                <a:spcPts val="600"/>
+              </a:spcAft>
+            </a:pPr>
+            <a:endParaRPr lang="en-US" sz="2400" dirty="0">
+              <a:latin typeface="+mj-lt"/>
+            </a:endParaRPr>
+          </a:p>
+          <a:p>
+            <a:pPr>
+              <a:lnSpc>
+                <a:spcPct val="90000"/>
+              </a:lnSpc>
+              <a:spcAft>
+                <a:spcPts val="600"/>
+              </a:spcAft>
+            </a:pPr>
+            <a:r>
+              <a:rPr lang="en-US" sz="3600" dirty="0">
+                <a:latin typeface="+mj-lt"/>
+              </a:rPr>
+              <a:t>Directions</a:t>
+            </a:r>
+          </a:p>
+          <a:p>
+            <a:pPr marL="342900" lvl="0" indent="-342900">
+              <a:buFont typeface="Arial" panose="020B0604020202020204" pitchFamily="34" charset="0"/>
+              <a:buChar char="•"/>
+            </a:pPr>
+            <a:r>
+              <a:rPr lang="en-US" sz="2000" dirty="0">
+                <a:latin typeface="Segoe UI Semilight" panose="020B0402040204020203" pitchFamily="34" charset="0"/>
+                <a:cs typeface="Segoe UI Semilight" panose="020B0402040204020203" pitchFamily="34" charset="0"/>
+              </a:rPr>
+              <a:t>Pair with another table</a:t>
+            </a:r>
+          </a:p>
+          <a:p>
+            <a:pPr marL="342900" lvl="0" indent="-342900">
+              <a:buFont typeface="Arial" panose="020B0604020202020204" pitchFamily="34" charset="0"/>
+              <a:buChar char="•"/>
+            </a:pPr>
+            <a:r>
+              <a:rPr lang="en-US" sz="2000" dirty="0">
+                <a:latin typeface="Segoe UI Semilight" panose="020B0402040204020203" pitchFamily="34" charset="0"/>
+                <a:cs typeface="Segoe UI Semilight" panose="020B0402040204020203" pitchFamily="34" charset="0"/>
+              </a:rPr>
+              <a:t>One table is the Microsoft team and the other table is the customer</a:t>
+            </a:r>
+          </a:p>
+          <a:p>
+            <a:pPr marL="342900" lvl="0" indent="-342900">
+              <a:buFont typeface="Arial" panose="020B0604020202020204" pitchFamily="34" charset="0"/>
+              <a:buChar char="•"/>
+            </a:pPr>
+            <a:r>
+              <a:rPr lang="en-US" sz="2000" dirty="0">
+                <a:latin typeface="Segoe UI Semilight" panose="020B0402040204020203" pitchFamily="34" charset="0"/>
+                <a:cs typeface="Segoe UI Semilight" panose="020B0402040204020203" pitchFamily="34" charset="0"/>
+              </a:rPr>
+              <a:t>The Microsoft team presents their proposed solution to the customer</a:t>
+            </a:r>
+          </a:p>
+          <a:p>
+            <a:pPr marL="342900" lvl="0" indent="-342900">
+              <a:buFont typeface="Arial" panose="020B0604020202020204" pitchFamily="34" charset="0"/>
+              <a:buChar char="•"/>
+            </a:pPr>
+            <a:r>
+              <a:rPr lang="en-US" sz="2000" dirty="0">
+                <a:latin typeface="Segoe UI Semilight" panose="020B0402040204020203" pitchFamily="34" charset="0"/>
+                <a:cs typeface="Segoe UI Semilight" panose="020B0402040204020203" pitchFamily="34" charset="0"/>
+              </a:rPr>
+              <a:t>The customer asks one of the objections from the list of objections in the case study</a:t>
+            </a:r>
+          </a:p>
+          <a:p>
+            <a:pPr marL="342900" lvl="0" indent="-342900">
+              <a:buFont typeface="Arial" panose="020B0604020202020204" pitchFamily="34" charset="0"/>
+              <a:buChar char="•"/>
+            </a:pPr>
+            <a:r>
+              <a:rPr lang="en-US" sz="2000" dirty="0">
+                <a:latin typeface="Segoe UI Semilight" panose="020B0402040204020203" pitchFamily="34" charset="0"/>
+                <a:cs typeface="Segoe UI Semilight" panose="020B0402040204020203" pitchFamily="34" charset="0"/>
+              </a:rPr>
+              <a:t>The Microsoft team responds to the objection</a:t>
+            </a:r>
+          </a:p>
+          <a:p>
+            <a:pPr marL="342900" lvl="0" indent="-342900">
+              <a:buFont typeface="Arial" panose="020B0604020202020204" pitchFamily="34" charset="0"/>
+              <a:buChar char="•"/>
+            </a:pPr>
+            <a:r>
+              <a:rPr lang="en-US" sz="2000" dirty="0">
+                <a:latin typeface="Segoe UI Semilight" panose="020B0402040204020203" pitchFamily="34" charset="0"/>
+                <a:cs typeface="Segoe UI Semilight" panose="020B0402040204020203" pitchFamily="34" charset="0"/>
+              </a:rPr>
+              <a:t>The customer team gives feedback to the Microsoft team</a:t>
+            </a:r>
+            <a:endParaRPr lang="en-US" sz="2000" strike="sngStrike" dirty="0">
+              <a:latin typeface="Segoe UI Semilight" panose="020B0402040204020203" pitchFamily="34" charset="0"/>
+              <a:cs typeface="Segoe UI Semilight" panose="020B0402040204020203" pitchFamily="34" charset="0"/>
+            </a:endParaRPr>
+          </a:p>
+          <a:p>
+            <a:pPr>
+              <a:lnSpc>
+                <a:spcPct val="90000"/>
+              </a:lnSpc>
+              <a:spcAft>
+                <a:spcPts val="600"/>
+              </a:spcAft>
+            </a:pPr>
+            <a:endParaRPr lang="en-US" sz="2400" dirty="0">
+              <a:latin typeface="Segoe UI Semilight" panose="020B0402040204020203" pitchFamily="34" charset="0"/>
+              <a:cs typeface="Segoe UI Semilight" panose="020B0402040204020203" pitchFamily="34" charset="0"/>
+            </a:endParaRPr>
+          </a:p>
+        </p:txBody>
+      </p:sp>
+    </p:spTree>
+    <p:extLst>
+      <p:ext uri="{BB962C8B-B14F-4D97-AF65-F5344CB8AC3E}">
+        <p14:creationId xmlns:p14="http://schemas.microsoft.com/office/powerpoint/2010/main" val="1629842568"/>
+      </p:ext>
+    </p:extLst>
+  </p:cSld>
+  <p:clrMapOvr>
+    <a:masterClrMapping/>
+  </p:clrMapOvr>
+  <mc:AlternateContent xmlns:mc="http://schemas.openxmlformats.org/markup-compatibility/2006" xmlns:p14="http://schemas.microsoft.com/office/powerpoint/2010/main">
+    <mc:Choice Requires="p14">
+      <p:transition p14:dur="0"/>
+    </mc:Choice>
+    <mc:Fallback xmlns="">
+      <p:transition/>
+    </mc:Fallback>
+  </mc:AlternateContent>
+</p:sld>
+</file>
+
+<file path=ppt/slides/slide17.xml><?xml version="1.0" encoding="utf-8"?>
+<p:sld xmlns:a="http://schemas.openxmlformats.org/drawingml/2006/main" xmlns:r="http://schemas.openxmlformats.org/officeDocument/2006/relationships" xmlns:p="http://schemas.openxmlformats.org/presentationml/2006/main">
+  <p:cSld>
+    <p:spTree>
+      <p:nvGrpSpPr>
+        <p:cNvPr id="1" name=""/>
+        <p:cNvGrpSpPr/>
+        <p:nvPr/>
+      </p:nvGrpSpPr>
+      <p:grpSpPr>
+        <a:xfrm>
+          <a:off x="0" y="0"/>
+          <a:ext cx="0" cy="0"/>
+          <a:chOff x="0" y="0"/>
+          <a:chExt cx="0" cy="0"/>
+        </a:xfrm>
+      </p:grpSpPr>
+      <p:sp>
+        <p:nvSpPr>
+          <p:cNvPr id="2" name="Title 1"/>
+          <p:cNvSpPr>
+            <a:spLocks noGrp="1"/>
+          </p:cNvSpPr>
+          <p:nvPr>
+            <p:ph type="title"/>
+          </p:nvPr>
+        </p:nvSpPr>
+        <p:spPr/>
+        <p:txBody>
+          <a:bodyPr>
+            <a:normAutofit/>
+          </a:bodyPr>
+          <a:lstStyle/>
+          <a:p>
+            <a:r>
+              <a:rPr lang="en-US" sz="4400" dirty="0">
+                <a:solidFill>
+                  <a:schemeClr val="tx1"/>
+                </a:solidFill>
+                <a:latin typeface="Segoe UI Light" panose="020B0502040204020203" pitchFamily="34" charset="0"/>
+                <a:cs typeface="Segoe UI Light" panose="020B0502040204020203" pitchFamily="34" charset="0"/>
+              </a:rPr>
               <a:t>Wrap-up</a:t>
             </a:r>
           </a:p>
@@ -17763,7 +17846,172 @@
 </p:sld>
 </file>
 
-<file path=ppt/slides/slide17.xml><?xml version="1.0" encoding="utf-8"?>
+<file path=ppt/slides/slide18.xml><?xml version="1.0" encoding="utf-8"?>
+<p:sld xmlns:a="http://schemas.openxmlformats.org/drawingml/2006/main" xmlns:r="http://schemas.openxmlformats.org/officeDocument/2006/relationships" xmlns:p="http://schemas.openxmlformats.org/presentationml/2006/main">
+  <p:cSld>
+    <p:spTree>
+      <p:nvGrpSpPr>
+        <p:cNvPr id="1" name=""/>
+        <p:cNvGrpSpPr/>
+        <p:nvPr/>
+      </p:nvGrpSpPr>
+      <p:grpSpPr>
+        <a:xfrm>
+          <a:off x="0" y="0"/>
+          <a:ext cx="0" cy="0"/>
+          <a:chOff x="0" y="0"/>
+          <a:chExt cx="0" cy="0"/>
+        </a:xfrm>
+      </p:grpSpPr>
+      <p:sp>
+        <p:nvSpPr>
+          <p:cNvPr id="2" name="Text Placeholder 1">
+            <a:extLst>
+              <a:ext uri="{FF2B5EF4-FFF2-40B4-BE49-F238E27FC236}">
+                <a16:creationId xmlns:a16="http://schemas.microsoft.com/office/drawing/2014/main" id="{91DC7814-09FE-4059-8EB7-E70F58C28338}"/>
+              </a:ext>
+            </a:extLst>
+          </p:cNvPr>
+          <p:cNvSpPr>
+            <a:spLocks noGrp="1"/>
+          </p:cNvSpPr>
+          <p:nvPr>
+            <p:ph type="body" sz="quarter" idx="10"/>
+          </p:nvPr>
+        </p:nvSpPr>
+        <p:spPr>
+          <a:xfrm>
+            <a:off x="269239" y="1189177"/>
+            <a:ext cx="11653523" cy="4046236"/>
+          </a:xfrm>
+        </p:spPr>
+        <p:txBody>
+          <a:bodyPr/>
+          <a:lstStyle/>
+          <a:p>
+            <a:endParaRPr lang="en-US" dirty="0"/>
+          </a:p>
+          <a:p>
+            <a:r>
+              <a:rPr lang="en-US" dirty="0"/>
+              <a:t>Alex Montgomery, VP of Sales</a:t>
+            </a:r>
+          </a:p>
+          <a:p>
+            <a:endParaRPr lang="en-US" dirty="0"/>
+          </a:p>
+          <a:p>
+            <a:r>
+              <a:rPr lang="en-US" dirty="0"/>
+              <a:t>Todd Culp, Enterprise Architect</a:t>
+            </a:r>
+          </a:p>
+          <a:p>
+            <a:endParaRPr lang="en-US" dirty="0"/>
+          </a:p>
+          <a:p>
+            <a:r>
+              <a:rPr lang="en-US" dirty="0"/>
+              <a:t>Development team</a:t>
+            </a:r>
+          </a:p>
+        </p:txBody>
+      </p:sp>
+      <p:sp>
+        <p:nvSpPr>
+          <p:cNvPr id="3" name="Title 2">
+            <a:extLst>
+              <a:ext uri="{FF2B5EF4-FFF2-40B4-BE49-F238E27FC236}">
+                <a16:creationId xmlns:a16="http://schemas.microsoft.com/office/drawing/2014/main" id="{547A17EF-E081-482B-B61B-A28E25486039}"/>
+              </a:ext>
+            </a:extLst>
+          </p:cNvPr>
+          <p:cNvSpPr>
+            <a:spLocks noGrp="1"/>
+          </p:cNvSpPr>
+          <p:nvPr>
+            <p:ph type="title"/>
+          </p:nvPr>
+        </p:nvSpPr>
+        <p:spPr/>
+        <p:txBody>
+          <a:bodyPr/>
+          <a:lstStyle/>
+          <a:p>
+            <a:r>
+              <a:rPr lang="en-US" sz="4800" dirty="0">
+                <a:solidFill>
+                  <a:schemeClr val="tx1"/>
+                </a:solidFill>
+              </a:rPr>
+              <a:t>Preferred target audience</a:t>
+            </a:r>
+            <a:br>
+              <a:rPr lang="en-US" dirty="0">
+                <a:solidFill>
+                  <a:schemeClr val="tx1"/>
+                </a:solidFill>
+                <a:latin typeface="Segoe UI" panose="020B0502040204020203" pitchFamily="34" charset="0"/>
+              </a:rPr>
+            </a:br>
+            <a:endParaRPr lang="en-US" dirty="0"/>
+          </a:p>
+        </p:txBody>
+      </p:sp>
+      <p:pic>
+        <p:nvPicPr>
+          <p:cNvPr id="5" name="Picture 4">
+            <a:extLst>
+              <a:ext uri="{FF2B5EF4-FFF2-40B4-BE49-F238E27FC236}">
+                <a16:creationId xmlns:a16="http://schemas.microsoft.com/office/drawing/2014/main" id="{61E8ED24-6033-4B40-A3BE-A24C53DC6B5C}"/>
+              </a:ext>
+            </a:extLst>
+          </p:cNvPr>
+          <p:cNvPicPr>
+            <a:picLocks noChangeAspect="1"/>
+          </p:cNvPicPr>
+          <p:nvPr/>
+        </p:nvPicPr>
+        <p:blipFill>
+          <a:blip r:embed="rId2">
+            <a:biLevel thresh="25000"/>
+            <a:extLst>
+              <a:ext uri="{28A0092B-C50C-407E-A947-70E740481C1C}">
+                <a14:useLocalDpi xmlns:a14="http://schemas.microsoft.com/office/drawing/2010/main" val="0"/>
+              </a:ext>
+            </a:extLst>
+          </a:blip>
+          <a:stretch>
+            <a:fillRect/>
+          </a:stretch>
+        </p:blipFill>
+        <p:spPr>
+          <a:xfrm>
+            <a:off x="8725215" y="3683230"/>
+            <a:ext cx="2321227" cy="2321227"/>
+          </a:xfrm>
+          <a:prstGeom prst="rect">
+            <a:avLst/>
+          </a:prstGeom>
+        </p:spPr>
+      </p:pic>
+    </p:spTree>
+    <p:extLst>
+      <p:ext uri="{BB962C8B-B14F-4D97-AF65-F5344CB8AC3E}">
+        <p14:creationId xmlns:p14="http://schemas.microsoft.com/office/powerpoint/2010/main" val="3024316668"/>
+      </p:ext>
+    </p:extLst>
+  </p:cSld>
+  <p:clrMapOvr>
+    <a:masterClrMapping/>
+  </p:clrMapOvr>
+  <p:transition>
+    <p:fade/>
+  </p:transition>
+</p:sld>
+</file>
+
+<file path=ppt/slides/slide19.xml><?xml version="1.0" encoding="utf-8"?>
 <p:sld xmlns:a="http://schemas.openxmlformats.org/drawingml/2006/main" xmlns:r="http://schemas.openxmlformats.org/officeDocument/2006/relationships" xmlns:p="http://schemas.openxmlformats.org/presentationml/2006/main">
   <p:cSld>
     <p:spTree>
@@ -20284,251 +20532,6 @@
 </p:sld>
 </file>
 
-<file path=ppt/slides/slide18.xml><?xml version="1.0" encoding="utf-8"?>
-<p:sld xmlns:a="http://schemas.openxmlformats.org/drawingml/2006/main" xmlns:r="http://schemas.openxmlformats.org/officeDocument/2006/relationships" xmlns:p="http://schemas.openxmlformats.org/presentationml/2006/main">
-  <p:cSld>
-    <p:spTree>
-      <p:nvGrpSpPr>
-        <p:cNvPr id="1" name=""/>
-        <p:cNvGrpSpPr/>
-        <p:nvPr/>
-      </p:nvGrpSpPr>
-      <p:grpSpPr>
-        <a:xfrm>
-          <a:off x="0" y="0"/>
-          <a:ext cx="0" cy="0"/>
-          <a:chOff x="0" y="0"/>
-          <a:chExt cx="0" cy="0"/>
-        </a:xfrm>
-      </p:grpSpPr>
-      <p:sp>
-        <p:nvSpPr>
-          <p:cNvPr id="2" name="Title 1"/>
-          <p:cNvSpPr>
-            <a:spLocks noGrp="1"/>
-          </p:cNvSpPr>
-          <p:nvPr>
-            <p:ph type="title"/>
-          </p:nvPr>
-        </p:nvSpPr>
-        <p:spPr/>
-        <p:txBody>
-          <a:bodyPr>
-            <a:normAutofit/>
-          </a:bodyPr>
-          <a:lstStyle/>
-          <a:p>
-            <a:r>
-              <a:rPr lang="en-US" sz="4400" dirty="0">
-                <a:solidFill>
-                  <a:schemeClr val="tx1"/>
-                </a:solidFill>
-                <a:latin typeface="Segoe UI Light" panose="020B0502040204020203" pitchFamily="34" charset="0"/>
-                <a:cs typeface="Segoe UI Light" panose="020B0502040204020203" pitchFamily="34" charset="0"/>
-              </a:rPr>
-              <a:t>Customer objections</a:t>
-            </a:r>
-          </a:p>
-        </p:txBody>
-      </p:sp>
-      <p:sp>
-        <p:nvSpPr>
-          <p:cNvPr id="5" name="TextBox 4">
-            <a:extLst>
-              <a:ext uri="{FF2B5EF4-FFF2-40B4-BE49-F238E27FC236}">
-                <a16:creationId xmlns:a16="http://schemas.microsoft.com/office/drawing/2014/main" id="{43774872-0763-48CC-BE9F-CA175951977F}"/>
-              </a:ext>
-            </a:extLst>
-          </p:cNvPr>
-          <p:cNvSpPr txBox="1"/>
-          <p:nvPr/>
-        </p:nvSpPr>
-        <p:spPr>
-          <a:xfrm>
-            <a:off x="340285" y="1284044"/>
-            <a:ext cx="11584795" cy="4173450"/>
-          </a:xfrm>
-          <a:prstGeom prst="rect">
-            <a:avLst/>
-          </a:prstGeom>
-          <a:noFill/>
-        </p:spPr>
-        <p:txBody>
-          <a:bodyPr wrap="square" lIns="182880" tIns="146304" rIns="182880" bIns="146304" rtlCol="0">
-            <a:spAutoFit/>
-          </a:bodyPr>
-          <a:lstStyle/>
-          <a:p>
-            <a:pPr lvl="0"/>
-            <a:r>
-              <a:rPr lang="en-US" sz="2800" i="1" dirty="0"/>
-              <a:t>“We do not want to be locked in to a specific source control repository. We are evaluating GitHub and Visual Studio Team Services and need to be able to change between them without frustrating rework.”</a:t>
-            </a:r>
-          </a:p>
-          <a:p>
-            <a:pPr lvl="0"/>
-            <a:endParaRPr lang="en-US" sz="2800" i="1" dirty="0"/>
-          </a:p>
-          <a:p>
-            <a:pPr marL="457200" lvl="0" indent="-457200">
-              <a:buFont typeface="Arial" panose="020B0604020202020204" pitchFamily="34" charset="0"/>
-              <a:buChar char="•"/>
-            </a:pPr>
-            <a:r>
-              <a:rPr lang="en-US" sz="2800" dirty="0"/>
-              <a:t>Both Visual Studio Team Services and GitHub support git source control repositories. VSTS supports any accessible git repository and has specific additional integrations with GitHub. As long as the customer project uses git-based source control, VSTS can be used to build and deploy the project.</a:t>
-            </a:r>
-          </a:p>
-        </p:txBody>
-      </p:sp>
-    </p:spTree>
-    <p:extLst>
-      <p:ext uri="{BB962C8B-B14F-4D97-AF65-F5344CB8AC3E}">
-        <p14:creationId xmlns:p14="http://schemas.microsoft.com/office/powerpoint/2010/main" val="726860188"/>
-      </p:ext>
-    </p:extLst>
-  </p:cSld>
-  <p:clrMapOvr>
-    <a:masterClrMapping/>
-  </p:clrMapOvr>
-  <mc:AlternateContent xmlns:mc="http://schemas.openxmlformats.org/markup-compatibility/2006" xmlns:p14="http://schemas.microsoft.com/office/powerpoint/2010/main">
-    <mc:Choice Requires="p14">
-      <p:transition p14:dur="0"/>
-    </mc:Choice>
-    <mc:Fallback xmlns="">
-      <p:transition/>
-    </mc:Fallback>
-  </mc:AlternateContent>
-</p:sld>
-</file>
-
-<file path=ppt/slides/slide19.xml><?xml version="1.0" encoding="utf-8"?>
-<p:sld xmlns:a="http://schemas.openxmlformats.org/drawingml/2006/main" xmlns:r="http://schemas.openxmlformats.org/officeDocument/2006/relationships" xmlns:p="http://schemas.openxmlformats.org/presentationml/2006/main">
-  <p:cSld>
-    <p:spTree>
-      <p:nvGrpSpPr>
-        <p:cNvPr id="1" name=""/>
-        <p:cNvGrpSpPr/>
-        <p:nvPr/>
-      </p:nvGrpSpPr>
-      <p:grpSpPr>
-        <a:xfrm>
-          <a:off x="0" y="0"/>
-          <a:ext cx="0" cy="0"/>
-          <a:chOff x="0" y="0"/>
-          <a:chExt cx="0" cy="0"/>
-        </a:xfrm>
-      </p:grpSpPr>
-      <p:sp>
-        <p:nvSpPr>
-          <p:cNvPr id="2" name="Title 1"/>
-          <p:cNvSpPr>
-            <a:spLocks noGrp="1"/>
-          </p:cNvSpPr>
-          <p:nvPr>
-            <p:ph type="title"/>
-          </p:nvPr>
-        </p:nvSpPr>
-        <p:spPr/>
-        <p:txBody>
-          <a:bodyPr>
-            <a:normAutofit/>
-          </a:bodyPr>
-          <a:lstStyle/>
-          <a:p>
-            <a:r>
-              <a:rPr lang="en-US" sz="4400" dirty="0">
-                <a:solidFill>
-                  <a:schemeClr val="tx1"/>
-                </a:solidFill>
-                <a:latin typeface="Segoe UI Light" panose="020B0502040204020203" pitchFamily="34" charset="0"/>
-                <a:cs typeface="Segoe UI Light" panose="020B0502040204020203" pitchFamily="34" charset="0"/>
-              </a:rPr>
-              <a:t>Customer objections</a:t>
-            </a:r>
-          </a:p>
-        </p:txBody>
-      </p:sp>
-      <p:sp>
-        <p:nvSpPr>
-          <p:cNvPr id="5" name="TextBox 4">
-            <a:extLst>
-              <a:ext uri="{FF2B5EF4-FFF2-40B4-BE49-F238E27FC236}">
-                <a16:creationId xmlns:a16="http://schemas.microsoft.com/office/drawing/2014/main" id="{43774872-0763-48CC-BE9F-CA175951977F}"/>
-              </a:ext>
-            </a:extLst>
-          </p:cNvPr>
-          <p:cNvSpPr txBox="1"/>
-          <p:nvPr/>
-        </p:nvSpPr>
-        <p:spPr>
-          <a:xfrm>
-            <a:off x="340285" y="1284044"/>
-            <a:ext cx="11584795" cy="4173450"/>
-          </a:xfrm>
-          <a:prstGeom prst="rect">
-            <a:avLst/>
-          </a:prstGeom>
-          <a:noFill/>
-        </p:spPr>
-        <p:txBody>
-          <a:bodyPr wrap="square" lIns="182880" tIns="146304" rIns="182880" bIns="146304" rtlCol="0">
-            <a:spAutoFit/>
-          </a:bodyPr>
-          <a:lstStyle/>
-          <a:p>
-            <a:pPr lvl="0"/>
-            <a:r>
-              <a:rPr lang="en-US" sz="2800" i="1" dirty="0"/>
-              <a:t>“We do not want the developers to be able to make changes to the Azure resources even though they will have access to make source code changes.”</a:t>
-            </a:r>
-          </a:p>
-          <a:p>
-            <a:pPr lvl="0"/>
-            <a:endParaRPr lang="en-US" sz="2800" i="1" dirty="0"/>
-          </a:p>
-          <a:p>
-            <a:pPr marL="457200" indent="-457200">
-              <a:buFont typeface="Arial" panose="020B0604020202020204" pitchFamily="34" charset="0"/>
-              <a:buChar char="•"/>
-            </a:pPr>
-            <a:r>
-              <a:rPr lang="en-US" sz="2800" dirty="0"/>
-              <a:t>This solution would remove the need to provide access to these specific environments from the developers. The company could provide other access (i.e. MSDN subscriptions) that developers could use to explore the features of </a:t>
-            </a:r>
-            <a:r>
-              <a:rPr lang="en-US" sz="2800"/>
-              <a:t>the platform.</a:t>
-            </a:r>
-            <a:endParaRPr lang="en-US" sz="2800" dirty="0"/>
-          </a:p>
-          <a:p>
-            <a:pPr lvl="0"/>
-            <a:endParaRPr lang="en-US" sz="2800" dirty="0"/>
-          </a:p>
-        </p:txBody>
-      </p:sp>
-    </p:spTree>
-    <p:extLst>
-      <p:ext uri="{BB962C8B-B14F-4D97-AF65-F5344CB8AC3E}">
-        <p14:creationId xmlns:p14="http://schemas.microsoft.com/office/powerpoint/2010/main" val="1750381226"/>
-      </p:ext>
-    </p:extLst>
-  </p:cSld>
-  <p:clrMapOvr>
-    <a:masterClrMapping/>
-  </p:clrMapOvr>
-  <mc:AlternateContent xmlns:mc="http://schemas.openxmlformats.org/markup-compatibility/2006" xmlns:p14="http://schemas.microsoft.com/office/powerpoint/2010/main">
-    <mc:Choice Requires="p14">
-      <p:transition p14:dur="0"/>
-    </mc:Choice>
-    <mc:Fallback xmlns="">
-      <p:transition/>
-    </mc:Fallback>
-  </mc:AlternateContent>
-</p:sld>
-</file>
-
 <file path=ppt/slides/slide2.xml><?xml version="1.0" encoding="utf-8"?>
 <p:sld xmlns:a="http://schemas.openxmlformats.org/drawingml/2006/main" xmlns:r="http://schemas.openxmlformats.org/officeDocument/2006/relationships" xmlns:p="http://schemas.openxmlformats.org/presentationml/2006/main">
   <p:cSld>
@@ -20849,7 +20852,7 @@
             <a:pPr lvl="0"/>
             <a:r>
               <a:rPr lang="en-US" sz="2800" i="1" dirty="0"/>
-              <a:t>“If developers can deploy directly to the cloud, will that expose us to the same quality problems we had before when untested code was promoted to production?”</a:t>
+              <a:t>“We do not want to be locked in to a specific source control repository. We are evaluating GitHub and Visual Studio Team Services and need to be able to change between them without frustrating rework.”</a:t>
             </a:r>
           </a:p>
           <a:p>
@@ -20857,13 +20860,13 @@
             <a:endParaRPr lang="en-US" sz="2800" i="1" dirty="0"/>
           </a:p>
           <a:p>
-            <a:pPr marL="457200" indent="-457200">
+            <a:pPr marL="457200" lvl="0" indent="-457200">
               <a:buFont typeface="Arial" panose="020B0604020202020204" pitchFamily="34" charset="0"/>
               <a:buChar char="•"/>
             </a:pPr>
             <a:r>
               <a:rPr lang="en-US" sz="2800" dirty="0"/>
-              <a:t>If we use Visual Studio Team Service’s Release Management features, we have the opportunity to configure all of the necessary rules / approvals for ensuring a smooth and secure deployment process. The goal here is to remove human touches from the process thus increasing the stability of the release process.</a:t>
+              <a:t>Both Visual Studio Team Services and GitHub support git source control repositories. VSTS supports any accessible git repository and has specific additional integrations with GitHub. As long as the customer project uses git-based source control, VSTS can be used to build and deploy the project.</a:t>
             </a:r>
           </a:p>
         </p:txBody>
@@ -20871,7 +20874,7 @@
     </p:spTree>
     <p:extLst>
       <p:ext uri="{BB962C8B-B14F-4D97-AF65-F5344CB8AC3E}">
-        <p14:creationId xmlns:p14="http://schemas.microsoft.com/office/powerpoint/2010/main" val="27405222"/>
+        <p14:creationId xmlns:p14="http://schemas.microsoft.com/office/powerpoint/2010/main" val="726860188"/>
       </p:ext>
     </p:extLst>
   </p:cSld>
@@ -20967,7 +20970,7 @@
             <a:pPr lvl="0"/>
             <a:r>
               <a:rPr lang="en-US" sz="2800" i="1" dirty="0"/>
-              <a:t>“How much of an impact will these process changes have on our development cadence? Will learning this place a new burden on the developers?”</a:t>
+              <a:t>“We do not want the developers to be able to make changes to the Azure resources even though they will have access to make source code changes.”</a:t>
             </a:r>
           </a:p>
           <a:p>
@@ -20981,15 +20984,24 @@
             </a:pPr>
             <a:r>
               <a:rPr lang="en-US" sz="2800" dirty="0"/>
-              <a:t>CI/CD is a commitment. To achieve velocity with confidence, there is a required rigor in testing that becomes key to success. This will likely result in a learning curve where you must slow down to go fast. It might even be painful at the start, but that pain is ultimately what drives the automation, monitoring, and incident handling efforts.</a:t>
+              <a:t>This solution would remove the need to provide access to these specific environments from the developers. The company could provide other access (i.e. MSDN subscriptions) that developers could use to explore the features of </a:t>
             </a:r>
+            <a:r>
+              <a:rPr lang="en-US" sz="2800"/>
+              <a:t>the platform.</a:t>
+            </a:r>
+            <a:endParaRPr lang="en-US" sz="2800" dirty="0"/>
+          </a:p>
+          <a:p>
+            <a:pPr lvl="0"/>
+            <a:endParaRPr lang="en-US" sz="2800" dirty="0"/>
           </a:p>
         </p:txBody>
       </p:sp>
     </p:spTree>
     <p:extLst>
       <p:ext uri="{BB962C8B-B14F-4D97-AF65-F5344CB8AC3E}">
-        <p14:creationId xmlns:p14="http://schemas.microsoft.com/office/powerpoint/2010/main" val="552850041"/>
+        <p14:creationId xmlns:p14="http://schemas.microsoft.com/office/powerpoint/2010/main" val="1750381226"/>
       </p:ext>
     </p:extLst>
   </p:cSld>
@@ -21069,7 +21081,7 @@
         <p:spPr>
           <a:xfrm>
             <a:off x="340285" y="1284044"/>
-            <a:ext cx="11584795" cy="4604337"/>
+            <a:ext cx="11584795" cy="4173450"/>
           </a:xfrm>
           <a:prstGeom prst="rect">
             <a:avLst/>
@@ -21085,7 +21097,7 @@
             <a:pPr lvl="0"/>
             <a:r>
               <a:rPr lang="en-US" sz="2800" i="1" dirty="0"/>
-              <a:t>“Our developers are already having a challenge learning how to use Git, will adding a continuous deployment system on top of that slow them down and confuse them even more?”</a:t>
+              <a:t>“If developers can deploy directly to the cloud, will that expose us to the same quality problems we had before when untested code was promoted to production?”</a:t>
             </a:r>
           </a:p>
           <a:p>
@@ -21099,7 +21111,7 @@
             </a:pPr>
             <a:r>
               <a:rPr lang="en-US" sz="2800" dirty="0"/>
-              <a:t>There is a learning curve with every quality gate added. Developers will need to do more automated testing locally to ensure code will pass the CI process. Working from master (or trunk) requires that developers really own the state of the build process. When the build is broken, fixing the build becomes the priority. This is another area where we slow down to go faster…with higher quality deliverable.</a:t>
+              <a:t>If we use Visual Studio Team Service’s Release Management features, we have the opportunity to configure all of the necessary rules / approvals for ensuring a smooth and secure deployment process. The goal here is to remove human touches from the process thus increasing the stability of the release process.</a:t>
             </a:r>
           </a:p>
         </p:txBody>
@@ -21107,7 +21119,7 @@
     </p:spTree>
     <p:extLst>
       <p:ext uri="{BB962C8B-B14F-4D97-AF65-F5344CB8AC3E}">
-        <p14:creationId xmlns:p14="http://schemas.microsoft.com/office/powerpoint/2010/main" val="987219656"/>
+        <p14:creationId xmlns:p14="http://schemas.microsoft.com/office/powerpoint/2010/main" val="27405222"/>
       </p:ext>
     </p:extLst>
   </p:cSld>
@@ -21155,6 +21167,242 @@
         <p:spPr/>
         <p:txBody>
           <a:bodyPr>
+            <a:normAutofit/>
+          </a:bodyPr>
+          <a:lstStyle/>
+          <a:p>
+            <a:r>
+              <a:rPr lang="en-US" sz="4400" dirty="0">
+                <a:solidFill>
+                  <a:schemeClr val="tx1"/>
+                </a:solidFill>
+                <a:latin typeface="Segoe UI Light" panose="020B0502040204020203" pitchFamily="34" charset="0"/>
+                <a:cs typeface="Segoe UI Light" panose="020B0502040204020203" pitchFamily="34" charset="0"/>
+              </a:rPr>
+              <a:t>Customer objections</a:t>
+            </a:r>
+          </a:p>
+        </p:txBody>
+      </p:sp>
+      <p:sp>
+        <p:nvSpPr>
+          <p:cNvPr id="5" name="TextBox 4">
+            <a:extLst>
+              <a:ext uri="{FF2B5EF4-FFF2-40B4-BE49-F238E27FC236}">
+                <a16:creationId xmlns:a16="http://schemas.microsoft.com/office/drawing/2014/main" id="{43774872-0763-48CC-BE9F-CA175951977F}"/>
+              </a:ext>
+            </a:extLst>
+          </p:cNvPr>
+          <p:cNvSpPr txBox="1"/>
+          <p:nvPr/>
+        </p:nvSpPr>
+        <p:spPr>
+          <a:xfrm>
+            <a:off x="340285" y="1284044"/>
+            <a:ext cx="11584795" cy="4173450"/>
+          </a:xfrm>
+          <a:prstGeom prst="rect">
+            <a:avLst/>
+          </a:prstGeom>
+          <a:noFill/>
+        </p:spPr>
+        <p:txBody>
+          <a:bodyPr wrap="square" lIns="182880" tIns="146304" rIns="182880" bIns="146304" rtlCol="0">
+            <a:spAutoFit/>
+          </a:bodyPr>
+          <a:lstStyle/>
+          <a:p>
+            <a:pPr lvl="0"/>
+            <a:r>
+              <a:rPr lang="en-US" sz="2800" i="1" dirty="0"/>
+              <a:t>“How much of an impact will these process changes have on our development cadence? Will learning this place a new burden on the developers?”</a:t>
+            </a:r>
+          </a:p>
+          <a:p>
+            <a:pPr lvl="0"/>
+            <a:endParaRPr lang="en-US" sz="2800" i="1" dirty="0"/>
+          </a:p>
+          <a:p>
+            <a:pPr marL="457200" indent="-457200">
+              <a:buFont typeface="Arial" panose="020B0604020202020204" pitchFamily="34" charset="0"/>
+              <a:buChar char="•"/>
+            </a:pPr>
+            <a:r>
+              <a:rPr lang="en-US" sz="2800" dirty="0"/>
+              <a:t>CI/CD is a commitment. To achieve velocity with confidence, there is a required rigor in testing that becomes key to success. This will likely result in a learning curve where you must slow down to go fast. It might even be painful at the start, but that pain is ultimately what drives the automation, monitoring, and incident handling efforts.</a:t>
+            </a:r>
+          </a:p>
+        </p:txBody>
+      </p:sp>
+    </p:spTree>
+    <p:extLst>
+      <p:ext uri="{BB962C8B-B14F-4D97-AF65-F5344CB8AC3E}">
+        <p14:creationId xmlns:p14="http://schemas.microsoft.com/office/powerpoint/2010/main" val="552850041"/>
+      </p:ext>
+    </p:extLst>
+  </p:cSld>
+  <p:clrMapOvr>
+    <a:masterClrMapping/>
+  </p:clrMapOvr>
+  <mc:AlternateContent xmlns:mc="http://schemas.openxmlformats.org/markup-compatibility/2006" xmlns:p14="http://schemas.microsoft.com/office/powerpoint/2010/main">
+    <mc:Choice Requires="p14">
+      <p:transition p14:dur="0"/>
+    </mc:Choice>
+    <mc:Fallback xmlns="">
+      <p:transition/>
+    </mc:Fallback>
+  </mc:AlternateContent>
+</p:sld>
+</file>
+
+<file path=ppt/slides/slide24.xml><?xml version="1.0" encoding="utf-8"?>
+<p:sld xmlns:a="http://schemas.openxmlformats.org/drawingml/2006/main" xmlns:r="http://schemas.openxmlformats.org/officeDocument/2006/relationships" xmlns:p="http://schemas.openxmlformats.org/presentationml/2006/main">
+  <p:cSld>
+    <p:spTree>
+      <p:nvGrpSpPr>
+        <p:cNvPr id="1" name=""/>
+        <p:cNvGrpSpPr/>
+        <p:nvPr/>
+      </p:nvGrpSpPr>
+      <p:grpSpPr>
+        <a:xfrm>
+          <a:off x="0" y="0"/>
+          <a:ext cx="0" cy="0"/>
+          <a:chOff x="0" y="0"/>
+          <a:chExt cx="0" cy="0"/>
+        </a:xfrm>
+      </p:grpSpPr>
+      <p:sp>
+        <p:nvSpPr>
+          <p:cNvPr id="2" name="Title 1"/>
+          <p:cNvSpPr>
+            <a:spLocks noGrp="1"/>
+          </p:cNvSpPr>
+          <p:nvPr>
+            <p:ph type="title"/>
+          </p:nvPr>
+        </p:nvSpPr>
+        <p:spPr/>
+        <p:txBody>
+          <a:bodyPr>
+            <a:normAutofit/>
+          </a:bodyPr>
+          <a:lstStyle/>
+          <a:p>
+            <a:r>
+              <a:rPr lang="en-US" sz="4400" dirty="0">
+                <a:solidFill>
+                  <a:schemeClr val="tx1"/>
+                </a:solidFill>
+                <a:latin typeface="Segoe UI Light" panose="020B0502040204020203" pitchFamily="34" charset="0"/>
+                <a:cs typeface="Segoe UI Light" panose="020B0502040204020203" pitchFamily="34" charset="0"/>
+              </a:rPr>
+              <a:t>Customer objections</a:t>
+            </a:r>
+          </a:p>
+        </p:txBody>
+      </p:sp>
+      <p:sp>
+        <p:nvSpPr>
+          <p:cNvPr id="5" name="TextBox 4">
+            <a:extLst>
+              <a:ext uri="{FF2B5EF4-FFF2-40B4-BE49-F238E27FC236}">
+                <a16:creationId xmlns:a16="http://schemas.microsoft.com/office/drawing/2014/main" id="{43774872-0763-48CC-BE9F-CA175951977F}"/>
+              </a:ext>
+            </a:extLst>
+          </p:cNvPr>
+          <p:cNvSpPr txBox="1"/>
+          <p:nvPr/>
+        </p:nvSpPr>
+        <p:spPr>
+          <a:xfrm>
+            <a:off x="340285" y="1284044"/>
+            <a:ext cx="11584795" cy="4604337"/>
+          </a:xfrm>
+          <a:prstGeom prst="rect">
+            <a:avLst/>
+          </a:prstGeom>
+          <a:noFill/>
+        </p:spPr>
+        <p:txBody>
+          <a:bodyPr wrap="square" lIns="182880" tIns="146304" rIns="182880" bIns="146304" rtlCol="0">
+            <a:spAutoFit/>
+          </a:bodyPr>
+          <a:lstStyle/>
+          <a:p>
+            <a:pPr lvl="0"/>
+            <a:r>
+              <a:rPr lang="en-US" sz="2800" i="1" dirty="0"/>
+              <a:t>“Our developers are already having a challenge learning how to use Git, will adding a continuous deployment system on top of that slow them down and confuse them even more?”</a:t>
+            </a:r>
+          </a:p>
+          <a:p>
+            <a:pPr lvl="0"/>
+            <a:endParaRPr lang="en-US" sz="2800" i="1" dirty="0"/>
+          </a:p>
+          <a:p>
+            <a:pPr marL="457200" indent="-457200">
+              <a:buFont typeface="Arial" panose="020B0604020202020204" pitchFamily="34" charset="0"/>
+              <a:buChar char="•"/>
+            </a:pPr>
+            <a:r>
+              <a:rPr lang="en-US" sz="2800" dirty="0"/>
+              <a:t>There is a learning curve with every quality gate added. Developers will need to do more automated testing locally to ensure code will pass the CI process. Working from master (or trunk) requires that developers really own the state of the build process. When the build is broken, fixing the build becomes the priority. This is another area where we slow down to go faster…with higher quality deliverable.</a:t>
+            </a:r>
+          </a:p>
+        </p:txBody>
+      </p:sp>
+    </p:spTree>
+    <p:extLst>
+      <p:ext uri="{BB962C8B-B14F-4D97-AF65-F5344CB8AC3E}">
+        <p14:creationId xmlns:p14="http://schemas.microsoft.com/office/powerpoint/2010/main" val="987219656"/>
+      </p:ext>
+    </p:extLst>
+  </p:cSld>
+  <p:clrMapOvr>
+    <a:masterClrMapping/>
+  </p:clrMapOvr>
+  <mc:AlternateContent xmlns:mc="http://schemas.openxmlformats.org/markup-compatibility/2006" xmlns:p14="http://schemas.microsoft.com/office/powerpoint/2010/main">
+    <mc:Choice Requires="p14">
+      <p:transition p14:dur="0"/>
+    </mc:Choice>
+    <mc:Fallback xmlns="">
+      <p:transition/>
+    </mc:Fallback>
+  </mc:AlternateContent>
+</p:sld>
+</file>
+
+<file path=ppt/slides/slide25.xml><?xml version="1.0" encoding="utf-8"?>
+<p:sld xmlns:a="http://schemas.openxmlformats.org/drawingml/2006/main" xmlns:r="http://schemas.openxmlformats.org/officeDocument/2006/relationships" xmlns:p="http://schemas.openxmlformats.org/presentationml/2006/main">
+  <p:cSld>
+    <p:spTree>
+      <p:nvGrpSpPr>
+        <p:cNvPr id="1" name=""/>
+        <p:cNvGrpSpPr/>
+        <p:nvPr/>
+      </p:nvGrpSpPr>
+      <p:grpSpPr>
+        <a:xfrm>
+          <a:off x="0" y="0"/>
+          <a:ext cx="0" cy="0"/>
+          <a:chOff x="0" y="0"/>
+          <a:chExt cx="0" cy="0"/>
+        </a:xfrm>
+      </p:grpSpPr>
+      <p:sp>
+        <p:nvSpPr>
+          <p:cNvPr id="2" name="Title 1"/>
+          <p:cNvSpPr>
+            <a:spLocks noGrp="1"/>
+          </p:cNvSpPr>
+          <p:nvPr>
+            <p:ph type="title"/>
+          </p:nvPr>
+        </p:nvSpPr>
+        <p:spPr/>
+        <p:txBody>
+          <a:bodyPr>
             <a:normAutofit fontScale="90000"/>
           </a:bodyPr>
           <a:lstStyle/>
@@ -21251,7 +21499,7 @@
 </p:sld>
 </file>
 
-<file path=ppt/slides/slide24.xml><?xml version="1.0" encoding="utf-8"?>
+<file path=ppt/slides/slide26.xml><?xml version="1.0" encoding="utf-8"?>
 <p:sld xmlns:a="http://schemas.openxmlformats.org/drawingml/2006/main" xmlns:r="http://schemas.openxmlformats.org/officeDocument/2006/relationships" xmlns:p="http://schemas.openxmlformats.org/presentationml/2006/main">
   <p:cSld>
     <p:bg>

</xml_diff>